<commit_message>
handbook/: update deliverables schedule
</commit_message>
<xml_diff>
--- a/diagrams/handbook/timeline.pptx
+++ b/diagrams/handbook/timeline.pptx
@@ -104,6 +104,22 @@
       </a:defRPr>
     </a:lvl9pPr>
   </p:defaultTextStyle>
+  <p:extLst>
+    <p:ext uri="{EFAFB233-063F-42B5-8137-9DF3F51BA10A}">
+      <p15:sldGuideLst xmlns:p15="http://schemas.microsoft.com/office/powerpoint/2012/main">
+        <p15:guide id="1" orient="horz" pos="2160">
+          <p15:clr>
+            <a:srgbClr val="A4A3A4"/>
+          </p15:clr>
+        </p15:guide>
+        <p15:guide id="2" pos="2880">
+          <p15:clr>
+            <a:srgbClr val="A4A3A4"/>
+          </p15:clr>
+        </p15:guide>
+      </p15:sldGuideLst>
+    </p:ext>
+  </p:extLst>
 </p:presentation>
 </file>
 
@@ -289,7 +305,7 @@
             <a:fld id="{1D8BD707-D9CF-40AE-B4C6-C98DA3205C09}" type="datetimeFigureOut">
               <a:rPr lang="en-US" smtClean="0"/>
               <a:pPr/>
-              <a:t>7/19/2017</a:t>
+              <a:t>7/27/2017</a:t>
             </a:fld>
             <a:endParaRPr lang="en-US"/>
           </a:p>
@@ -456,7 +472,7 @@
             <a:fld id="{1D8BD707-D9CF-40AE-B4C6-C98DA3205C09}" type="datetimeFigureOut">
               <a:rPr lang="en-US" smtClean="0"/>
               <a:pPr/>
-              <a:t>7/19/2017</a:t>
+              <a:t>7/27/2017</a:t>
             </a:fld>
             <a:endParaRPr lang="en-US"/>
           </a:p>
@@ -633,7 +649,7 @@
             <a:fld id="{1D8BD707-D9CF-40AE-B4C6-C98DA3205C09}" type="datetimeFigureOut">
               <a:rPr lang="en-US" smtClean="0"/>
               <a:pPr/>
-              <a:t>7/19/2017</a:t>
+              <a:t>7/27/2017</a:t>
             </a:fld>
             <a:endParaRPr lang="en-US"/>
           </a:p>
@@ -800,7 +816,7 @@
             <a:fld id="{1D8BD707-D9CF-40AE-B4C6-C98DA3205C09}" type="datetimeFigureOut">
               <a:rPr lang="en-US" smtClean="0"/>
               <a:pPr/>
-              <a:t>7/19/2017</a:t>
+              <a:t>7/27/2017</a:t>
             </a:fld>
             <a:endParaRPr lang="en-US"/>
           </a:p>
@@ -1043,7 +1059,7 @@
             <a:fld id="{1D8BD707-D9CF-40AE-B4C6-C98DA3205C09}" type="datetimeFigureOut">
               <a:rPr lang="en-US" smtClean="0"/>
               <a:pPr/>
-              <a:t>7/19/2017</a:t>
+              <a:t>7/27/2017</a:t>
             </a:fld>
             <a:endParaRPr lang="en-US"/>
           </a:p>
@@ -1328,7 +1344,7 @@
             <a:fld id="{1D8BD707-D9CF-40AE-B4C6-C98DA3205C09}" type="datetimeFigureOut">
               <a:rPr lang="en-US" smtClean="0"/>
               <a:pPr/>
-              <a:t>7/19/2017</a:t>
+              <a:t>7/27/2017</a:t>
             </a:fld>
             <a:endParaRPr lang="en-US"/>
           </a:p>
@@ -1747,7 +1763,7 @@
             <a:fld id="{1D8BD707-D9CF-40AE-B4C6-C98DA3205C09}" type="datetimeFigureOut">
               <a:rPr lang="en-US" smtClean="0"/>
               <a:pPr/>
-              <a:t>7/19/2017</a:t>
+              <a:t>7/27/2017</a:t>
             </a:fld>
             <a:endParaRPr lang="en-US"/>
           </a:p>
@@ -1862,7 +1878,7 @@
             <a:fld id="{1D8BD707-D9CF-40AE-B4C6-C98DA3205C09}" type="datetimeFigureOut">
               <a:rPr lang="en-US" smtClean="0"/>
               <a:pPr/>
-              <a:t>7/19/2017</a:t>
+              <a:t>7/27/2017</a:t>
             </a:fld>
             <a:endParaRPr lang="en-US"/>
           </a:p>
@@ -1954,7 +1970,7 @@
             <a:fld id="{1D8BD707-D9CF-40AE-B4C6-C98DA3205C09}" type="datetimeFigureOut">
               <a:rPr lang="en-US" smtClean="0"/>
               <a:pPr/>
-              <a:t>7/19/2017</a:t>
+              <a:t>7/27/2017</a:t>
             </a:fld>
             <a:endParaRPr lang="en-US"/>
           </a:p>
@@ -2228,7 +2244,7 @@
             <a:fld id="{1D8BD707-D9CF-40AE-B4C6-C98DA3205C09}" type="datetimeFigureOut">
               <a:rPr lang="en-US" smtClean="0"/>
               <a:pPr/>
-              <a:t>7/19/2017</a:t>
+              <a:t>7/27/2017</a:t>
             </a:fld>
             <a:endParaRPr lang="en-US"/>
           </a:p>
@@ -2478,7 +2494,7 @@
             <a:fld id="{1D8BD707-D9CF-40AE-B4C6-C98DA3205C09}" type="datetimeFigureOut">
               <a:rPr lang="en-US" smtClean="0"/>
               <a:pPr/>
-              <a:t>7/19/2017</a:t>
+              <a:t>7/27/2017</a:t>
             </a:fld>
             <a:endParaRPr lang="en-US"/>
           </a:p>
@@ -2688,7 +2704,7 @@
             <a:fld id="{1D8BD707-D9CF-40AE-B4C6-C98DA3205C09}" type="datetimeFigureOut">
               <a:rPr lang="en-US" smtClean="0"/>
               <a:pPr/>
-              <a:t>7/19/2017</a:t>
+              <a:t>7/27/2017</a:t>
             </a:fld>
             <a:endParaRPr lang="en-US"/>
           </a:p>
@@ -3493,7 +3509,7 @@
             <a:pPr algn="ctr"/>
             <a:r>
               <a:rPr lang="en-US" sz="900" dirty="0" smtClean="0"/>
-              <a:t>V2.0</a:t>
+              <a:t>v1.0</a:t>
             </a:r>
             <a:endParaRPr lang="en-SG" sz="900" dirty="0"/>
           </a:p>
@@ -3550,7 +3566,7 @@
             <a:pPr algn="ctr"/>
             <a:r>
               <a:rPr lang="en-US" sz="900" dirty="0" smtClean="0"/>
-              <a:t>V2.1</a:t>
+              <a:t>v1.1</a:t>
             </a:r>
             <a:endParaRPr lang="en-SG" sz="900" dirty="0"/>
           </a:p>
@@ -3607,7 +3623,7 @@
             <a:pPr algn="ctr"/>
             <a:r>
               <a:rPr lang="en-US" sz="900" dirty="0" smtClean="0"/>
-              <a:t>V2.2</a:t>
+              <a:t>v1.2</a:t>
             </a:r>
             <a:endParaRPr lang="en-SG" sz="900" dirty="0"/>
           </a:p>
@@ -3664,7 +3680,7 @@
             <a:pPr algn="ctr"/>
             <a:r>
               <a:rPr lang="en-US" sz="900" dirty="0" smtClean="0"/>
-              <a:t>V2.3</a:t>
+              <a:t>v1.3</a:t>
             </a:r>
             <a:endParaRPr lang="en-SG" sz="900" dirty="0"/>
           </a:p>
@@ -3721,7 +3737,7 @@
             <a:pPr algn="ctr"/>
             <a:r>
               <a:rPr lang="en-US" sz="900" dirty="0" smtClean="0"/>
-              <a:t>V2.4</a:t>
+              <a:t>v1.4</a:t>
             </a:r>
             <a:endParaRPr lang="en-SG" sz="900" dirty="0"/>
           </a:p>
@@ -3778,7 +3794,7 @@
             <a:pPr algn="ctr"/>
             <a:r>
               <a:rPr lang="en-US" sz="900" dirty="0" smtClean="0"/>
-              <a:t>V2.5rc</a:t>
+              <a:t>v1.5rc</a:t>
             </a:r>
             <a:endParaRPr lang="en-SG" sz="900" dirty="0"/>
           </a:p>
@@ -3835,7 +3851,7 @@
             <a:pPr algn="ctr"/>
             <a:r>
               <a:rPr lang="en-US" sz="900" dirty="0" smtClean="0"/>
-              <a:t>V2.5</a:t>
+              <a:t>v1.5</a:t>
             </a:r>
             <a:endParaRPr lang="en-SG" sz="900" dirty="0"/>
           </a:p>
@@ -4364,15 +4380,7 @@
                   <a:srgbClr val="00B050"/>
                 </a:solidFill>
               </a:rPr>
-              <a:t>Starter code </a:t>
-            </a:r>
-            <a:r>
-              <a:rPr lang="en-US" sz="1050" b="1" dirty="0" smtClean="0">
-                <a:solidFill>
-                  <a:srgbClr val="00B050"/>
-                </a:solidFill>
-              </a:rPr>
-              <a:t>releases</a:t>
+              <a:t>Starter code releases</a:t>
             </a:r>
             <a:endParaRPr lang="en-SG" sz="1050" b="1" dirty="0">
               <a:solidFill>

</xml_diff>